<commit_message>
Adding new content to the repository to show Brendan
</commit_message>
<xml_diff>
--- a/Docs/v1.0/InuitTransparentShowcase - MockUI.pptx
+++ b/Docs/v1.0/InuitTransparentShowcase - MockUI.pptx
@@ -126,6 +126,22 @@
       </a:defRPr>
     </a:lvl9pPr>
   </p:defaultTextStyle>
+  <p:extLst>
+    <p:ext uri="{EFAFB233-063F-42B5-8137-9DF3F51BA10A}">
+      <p15:sldGuideLst xmlns:p15="http://schemas.microsoft.com/office/powerpoint/2012/main">
+        <p15:guide id="1" orient="horz" pos="2618">
+          <p15:clr>
+            <a:srgbClr val="A4A3A4"/>
+          </p15:clr>
+        </p15:guide>
+        <p15:guide id="2" pos="3152">
+          <p15:clr>
+            <a:srgbClr val="A4A3A4"/>
+          </p15:clr>
+        </p15:guide>
+      </p15:sldGuideLst>
+    </p:ext>
+  </p:extLst>
 </p:presentation>
 </file>
 
@@ -211,7 +227,7 @@
           <a:p>
             <a:fld id="{B861E20A-27E1-4770-9216-DBEF67997CAD}" type="datetimeFigureOut">
               <a:rPr lang="en-CA" smtClean="0"/>
-              <a:t>15/11/2013</a:t>
+              <a:t>02/04/2014</a:t>
             </a:fld>
             <a:endParaRPr lang="en-CA"/>
           </a:p>
@@ -1164,7 +1180,7 @@
           <a:p>
             <a:fld id="{F0DAF099-954F-4ED4-86A3-0AD7F13127F0}" type="datetimeFigureOut">
               <a:rPr lang="en-CA" smtClean="0"/>
-              <a:t>15/11/2013</a:t>
+              <a:t>02/04/2014</a:t>
             </a:fld>
             <a:endParaRPr lang="en-CA"/>
           </a:p>
@@ -1334,7 +1350,7 @@
           <a:p>
             <a:fld id="{F0DAF099-954F-4ED4-86A3-0AD7F13127F0}" type="datetimeFigureOut">
               <a:rPr lang="en-CA" smtClean="0"/>
-              <a:t>15/11/2013</a:t>
+              <a:t>02/04/2014</a:t>
             </a:fld>
             <a:endParaRPr lang="en-CA"/>
           </a:p>
@@ -1514,7 +1530,7 @@
           <a:p>
             <a:fld id="{F0DAF099-954F-4ED4-86A3-0AD7F13127F0}" type="datetimeFigureOut">
               <a:rPr lang="en-CA" smtClean="0"/>
-              <a:t>15/11/2013</a:t>
+              <a:t>02/04/2014</a:t>
             </a:fld>
             <a:endParaRPr lang="en-CA"/>
           </a:p>
@@ -1684,7 +1700,7 @@
           <a:p>
             <a:fld id="{F0DAF099-954F-4ED4-86A3-0AD7F13127F0}" type="datetimeFigureOut">
               <a:rPr lang="en-CA" smtClean="0"/>
-              <a:t>15/11/2013</a:t>
+              <a:t>02/04/2014</a:t>
             </a:fld>
             <a:endParaRPr lang="en-CA"/>
           </a:p>
@@ -1930,7 +1946,7 @@
           <a:p>
             <a:fld id="{F0DAF099-954F-4ED4-86A3-0AD7F13127F0}" type="datetimeFigureOut">
               <a:rPr lang="en-CA" smtClean="0"/>
-              <a:t>15/11/2013</a:t>
+              <a:t>02/04/2014</a:t>
             </a:fld>
             <a:endParaRPr lang="en-CA"/>
           </a:p>
@@ -2218,7 +2234,7 @@
           <a:p>
             <a:fld id="{F0DAF099-954F-4ED4-86A3-0AD7F13127F0}" type="datetimeFigureOut">
               <a:rPr lang="en-CA" smtClean="0"/>
-              <a:t>15/11/2013</a:t>
+              <a:t>02/04/2014</a:t>
             </a:fld>
             <a:endParaRPr lang="en-CA"/>
           </a:p>
@@ -2640,7 +2656,7 @@
           <a:p>
             <a:fld id="{F0DAF099-954F-4ED4-86A3-0AD7F13127F0}" type="datetimeFigureOut">
               <a:rPr lang="en-CA" smtClean="0"/>
-              <a:t>15/11/2013</a:t>
+              <a:t>02/04/2014</a:t>
             </a:fld>
             <a:endParaRPr lang="en-CA"/>
           </a:p>
@@ -2758,7 +2774,7 @@
           <a:p>
             <a:fld id="{F0DAF099-954F-4ED4-86A3-0AD7F13127F0}" type="datetimeFigureOut">
               <a:rPr lang="en-CA" smtClean="0"/>
-              <a:t>15/11/2013</a:t>
+              <a:t>02/04/2014</a:t>
             </a:fld>
             <a:endParaRPr lang="en-CA"/>
           </a:p>
@@ -2853,7 +2869,7 @@
           <a:p>
             <a:fld id="{F0DAF099-954F-4ED4-86A3-0AD7F13127F0}" type="datetimeFigureOut">
               <a:rPr lang="en-CA" smtClean="0"/>
-              <a:t>15/11/2013</a:t>
+              <a:t>02/04/2014</a:t>
             </a:fld>
             <a:endParaRPr lang="en-CA"/>
           </a:p>
@@ -3130,7 +3146,7 @@
           <a:p>
             <a:fld id="{F0DAF099-954F-4ED4-86A3-0AD7F13127F0}" type="datetimeFigureOut">
               <a:rPr lang="en-CA" smtClean="0"/>
-              <a:t>15/11/2013</a:t>
+              <a:t>02/04/2014</a:t>
             </a:fld>
             <a:endParaRPr lang="en-CA"/>
           </a:p>
@@ -3383,7 +3399,7 @@
           <a:p>
             <a:fld id="{F0DAF099-954F-4ED4-86A3-0AD7F13127F0}" type="datetimeFigureOut">
               <a:rPr lang="en-CA" smtClean="0"/>
-              <a:t>15/11/2013</a:t>
+              <a:t>02/04/2014</a:t>
             </a:fld>
             <a:endParaRPr lang="en-CA"/>
           </a:p>
@@ -3596,7 +3612,7 @@
           <a:p>
             <a:fld id="{F0DAF099-954F-4ED4-86A3-0AD7F13127F0}" type="datetimeFigureOut">
               <a:rPr lang="en-CA" smtClean="0"/>
-              <a:t>15/11/2013</a:t>
+              <a:t>02/04/2014</a:t>
             </a:fld>
             <a:endParaRPr lang="en-CA"/>
           </a:p>
@@ -47516,7 +47532,7 @@
             <p:nvPr/>
           </p:nvPicPr>
           <p:blipFill>
-            <a:blip r:embed="rId9" cstate="print">
+            <a:blip r:embed="rId10" cstate="print">
               <a:extLst>
                 <a:ext uri="{28A0092B-C50C-407E-A947-70E740481C1C}">
                   <a14:useLocalDpi xmlns:a14="http://schemas.microsoft.com/office/drawing/2010/main" val="0"/>
@@ -47557,7 +47573,7 @@
             <p:nvPr/>
           </p:nvPicPr>
           <p:blipFill>
-            <a:blip r:embed="rId10" cstate="print">
+            <a:blip r:embed="rId11" cstate="print">
               <a:extLst>
                 <a:ext uri="{28A0092B-C50C-407E-A947-70E740481C1C}">
                   <a14:useLocalDpi xmlns:a14="http://schemas.microsoft.com/office/drawing/2010/main" val="0"/>
@@ -47600,13 +47616,13 @@
   <p:clrMapOvr>
     <a:masterClrMapping/>
   </p:clrMapOvr>
-  <mc:AlternateContent xmlns:mc="http://schemas.openxmlformats.org/markup-compatibility/2006">
-    <mc:Choice xmlns:p14="http://schemas.microsoft.com/office/powerpoint/2010/main" Requires="p14">
+  <mc:AlternateContent xmlns:mc="http://schemas.openxmlformats.org/markup-compatibility/2006" xmlns:p14="http://schemas.microsoft.com/office/powerpoint/2010/main">
+    <mc:Choice Requires="p14">
       <p:transition spd="med" p14:dur="700">
         <p:fade/>
       </p:transition>
     </mc:Choice>
-    <mc:Fallback>
+    <mc:Fallback xmlns="">
       <p:transition spd="med">
         <p:fade/>
       </p:transition>

</xml_diff>